<commit_message>
Aktualisierung Projektplanung Aktualisierung Präsi für Coachingtermin
</commit_message>
<xml_diff>
--- a/Dokumente/Coaching/2016-11-02 Präsentation Projektmgmt.pptx
+++ b/Dokumente/Coaching/2016-11-02 Präsentation Projektmgmt.pptx
@@ -327,7 +327,7 @@
     </p:spTree>
     <p:extLst>
       <p:ext uri="{BB962C8B-B14F-4D97-AF65-F5344CB8AC3E}">
-        <p14:creationId xmlns:p14="http://schemas.microsoft.com/office/powerpoint/2010/main" xmlns="" val="2667667891"/>
+        <p14:creationId xmlns="" xmlns:p14="http://schemas.microsoft.com/office/powerpoint/2010/main" val="2667667891"/>
       </p:ext>
     </p:extLst>
   </p:cSld>
@@ -605,7 +605,7 @@
     </p:spTree>
     <p:extLst>
       <p:ext uri="{BB962C8B-B14F-4D97-AF65-F5344CB8AC3E}">
-        <p14:creationId xmlns:p14="http://schemas.microsoft.com/office/powerpoint/2010/main" xmlns="" val="2795533648"/>
+        <p14:creationId xmlns="" xmlns:p14="http://schemas.microsoft.com/office/powerpoint/2010/main" val="2795533648"/>
       </p:ext>
     </p:extLst>
   </p:cSld>
@@ -778,7 +778,7 @@
           </a:ln>
           <a:extLst>
             <a:ext uri="{909E8E84-426E-40DD-AFC4-6F175D3DCCD1}">
-              <a14:hiddenFill xmlns:a14="http://schemas.microsoft.com/office/drawing/2010/main" xmlns="">
+              <a14:hiddenFill xmlns="" xmlns:a14="http://schemas.microsoft.com/office/drawing/2010/main">
                 <a:solidFill>
                   <a:srgbClr val="FFFFFF"/>
                 </a:solidFill>
@@ -801,14 +801,14 @@
           <a:noFill/>
           <a:extLst>
             <a:ext uri="{909E8E84-426E-40DD-AFC4-6F175D3DCCD1}">
-              <a14:hiddenFill xmlns:a14="http://schemas.microsoft.com/office/drawing/2010/main" xmlns="">
+              <a14:hiddenFill xmlns="" xmlns:a14="http://schemas.microsoft.com/office/drawing/2010/main">
                 <a:solidFill>
                   <a:srgbClr val="FFFFFF"/>
                 </a:solidFill>
               </a14:hiddenFill>
             </a:ext>
             <a:ext uri="{91240B29-F687-4F45-9708-019B960494DF}">
-              <a14:hiddenLine xmlns:a14="http://schemas.microsoft.com/office/drawing/2010/main" xmlns="" w="9525">
+              <a14:hiddenLine xmlns="" xmlns:a14="http://schemas.microsoft.com/office/drawing/2010/main" w="9525">
                 <a:solidFill>
                   <a:srgbClr val="000000"/>
                 </a:solidFill>
@@ -845,14 +845,14 @@
           <a:noFill/>
           <a:extLst>
             <a:ext uri="{909E8E84-426E-40DD-AFC4-6F175D3DCCD1}">
-              <a14:hiddenFill xmlns:a14="http://schemas.microsoft.com/office/drawing/2010/main" xmlns="">
+              <a14:hiddenFill xmlns="" xmlns:a14="http://schemas.microsoft.com/office/drawing/2010/main">
                 <a:solidFill>
                   <a:srgbClr val="FFFFFF"/>
                 </a:solidFill>
               </a14:hiddenFill>
             </a:ext>
             <a:ext uri="{91240B29-F687-4F45-9708-019B960494DF}">
-              <a14:hiddenLine xmlns:a14="http://schemas.microsoft.com/office/drawing/2010/main" xmlns="" w="9525">
+              <a14:hiddenLine xmlns="" xmlns:a14="http://schemas.microsoft.com/office/drawing/2010/main" w="9525">
                 <a:solidFill>
                   <a:srgbClr val="000000"/>
                 </a:solidFill>
@@ -1029,7 +1029,7 @@
           </a:ln>
           <a:extLst>
             <a:ext uri="{909E8E84-426E-40DD-AFC4-6F175D3DCCD1}">
-              <a14:hiddenFill xmlns:a14="http://schemas.microsoft.com/office/drawing/2010/main" xmlns="">
+              <a14:hiddenFill xmlns="" xmlns:a14="http://schemas.microsoft.com/office/drawing/2010/main">
                 <a:solidFill>
                   <a:srgbClr val="FFFFFF"/>
                 </a:solidFill>
@@ -1052,14 +1052,14 @@
           <a:noFill/>
           <a:extLst>
             <a:ext uri="{909E8E84-426E-40DD-AFC4-6F175D3DCCD1}">
-              <a14:hiddenFill xmlns:a14="http://schemas.microsoft.com/office/drawing/2010/main" xmlns="">
+              <a14:hiddenFill xmlns="" xmlns:a14="http://schemas.microsoft.com/office/drawing/2010/main">
                 <a:solidFill>
                   <a:srgbClr val="FFFFFF"/>
                 </a:solidFill>
               </a14:hiddenFill>
             </a:ext>
             <a:ext uri="{91240B29-F687-4F45-9708-019B960494DF}">
-              <a14:hiddenLine xmlns:a14="http://schemas.microsoft.com/office/drawing/2010/main" xmlns="" w="9525">
+              <a14:hiddenLine xmlns="" xmlns:a14="http://schemas.microsoft.com/office/drawing/2010/main" w="9525">
                 <a:solidFill>
                   <a:srgbClr val="000000"/>
                 </a:solidFill>
@@ -1096,14 +1096,14 @@
           <a:noFill/>
           <a:extLst>
             <a:ext uri="{909E8E84-426E-40DD-AFC4-6F175D3DCCD1}">
-              <a14:hiddenFill xmlns:a14="http://schemas.microsoft.com/office/drawing/2010/main" xmlns="">
+              <a14:hiddenFill xmlns="" xmlns:a14="http://schemas.microsoft.com/office/drawing/2010/main">
                 <a:solidFill>
                   <a:srgbClr val="FFFFFF"/>
                 </a:solidFill>
               </a14:hiddenFill>
             </a:ext>
             <a:ext uri="{91240B29-F687-4F45-9708-019B960494DF}">
-              <a14:hiddenLine xmlns:a14="http://schemas.microsoft.com/office/drawing/2010/main" xmlns="" w="9525">
+              <a14:hiddenLine xmlns="" xmlns:a14="http://schemas.microsoft.com/office/drawing/2010/main" w="9525">
                 <a:solidFill>
                   <a:srgbClr val="000000"/>
                 </a:solidFill>
@@ -1336,7 +1336,7 @@
           <a:blip r:embed="rId2">
             <a:extLst>
               <a:ext uri="{28A0092B-C50C-407E-A947-70E740481C1C}">
-                <a14:useLocalDpi xmlns:a14="http://schemas.microsoft.com/office/drawing/2010/main" xmlns="" val="0"/>
+                <a14:useLocalDpi xmlns="" xmlns:a14="http://schemas.microsoft.com/office/drawing/2010/main" val="0"/>
               </a:ext>
             </a:extLst>
           </a:blip>
@@ -1359,14 +1359,14 @@
           </a:ln>
           <a:extLst>
             <a:ext uri="{909E8E84-426E-40DD-AFC4-6F175D3DCCD1}">
-              <a14:hiddenFill xmlns:a14="http://schemas.microsoft.com/office/drawing/2010/main" xmlns="">
+              <a14:hiddenFill xmlns="" xmlns:a14="http://schemas.microsoft.com/office/drawing/2010/main">
                 <a:solidFill>
                   <a:srgbClr val="FFFFFF"/>
                 </a:solidFill>
               </a14:hiddenFill>
             </a:ext>
             <a:ext uri="{91240B29-F687-4F45-9708-019B960494DF}">
-              <a14:hiddenLine xmlns:a14="http://schemas.microsoft.com/office/drawing/2010/main" xmlns="" w="9525">
+              <a14:hiddenLine xmlns="" xmlns:a14="http://schemas.microsoft.com/office/drawing/2010/main" w="9525">
                 <a:solidFill>
                   <a:srgbClr val="000000"/>
                 </a:solidFill>
@@ -1598,7 +1598,7 @@
     </p:spTree>
     <p:extLst>
       <p:ext uri="{BB962C8B-B14F-4D97-AF65-F5344CB8AC3E}">
-        <p14:creationId xmlns:p14="http://schemas.microsoft.com/office/powerpoint/2010/main" xmlns="" val="161433667"/>
+        <p14:creationId xmlns="" xmlns:p14="http://schemas.microsoft.com/office/powerpoint/2010/main" val="161433667"/>
       </p:ext>
     </p:extLst>
   </p:cSld>
@@ -1783,7 +1783,7 @@
           <a:blip r:embed="rId2">
             <a:extLst>
               <a:ext uri="{28A0092B-C50C-407E-A947-70E740481C1C}">
-                <a14:useLocalDpi xmlns:a14="http://schemas.microsoft.com/office/drawing/2010/main" xmlns="" val="0"/>
+                <a14:useLocalDpi xmlns="" xmlns:a14="http://schemas.microsoft.com/office/drawing/2010/main" val="0"/>
               </a:ext>
             </a:extLst>
           </a:blip>
@@ -1806,14 +1806,14 @@
           </a:ln>
           <a:extLst>
             <a:ext uri="{909E8E84-426E-40DD-AFC4-6F175D3DCCD1}">
-              <a14:hiddenFill xmlns:a14="http://schemas.microsoft.com/office/drawing/2010/main" xmlns="">
+              <a14:hiddenFill xmlns="" xmlns:a14="http://schemas.microsoft.com/office/drawing/2010/main">
                 <a:solidFill>
                   <a:srgbClr val="FFFFFF"/>
                 </a:solidFill>
               </a14:hiddenFill>
             </a:ext>
             <a:ext uri="{91240B29-F687-4F45-9708-019B960494DF}">
-              <a14:hiddenLine xmlns:a14="http://schemas.microsoft.com/office/drawing/2010/main" xmlns="" w="9525">
+              <a14:hiddenLine xmlns="" xmlns:a14="http://schemas.microsoft.com/office/drawing/2010/main" w="9525">
                 <a:solidFill>
                   <a:srgbClr val="000000"/>
                 </a:solidFill>
@@ -1955,7 +1955,7 @@
     </p:spTree>
     <p:extLst>
       <p:ext uri="{BB962C8B-B14F-4D97-AF65-F5344CB8AC3E}">
-        <p14:creationId xmlns:p14="http://schemas.microsoft.com/office/powerpoint/2010/main" xmlns="" val="3865959554"/>
+        <p14:creationId xmlns="" xmlns:p14="http://schemas.microsoft.com/office/powerpoint/2010/main" val="3865959554"/>
       </p:ext>
     </p:extLst>
   </p:cSld>
@@ -2140,7 +2140,7 @@
           <a:blip r:embed="rId2">
             <a:extLst>
               <a:ext uri="{28A0092B-C50C-407E-A947-70E740481C1C}">
-                <a14:useLocalDpi xmlns:a14="http://schemas.microsoft.com/office/drawing/2010/main" xmlns="" val="0"/>
+                <a14:useLocalDpi xmlns="" xmlns:a14="http://schemas.microsoft.com/office/drawing/2010/main" val="0"/>
               </a:ext>
             </a:extLst>
           </a:blip>
@@ -2163,14 +2163,14 @@
           </a:ln>
           <a:extLst>
             <a:ext uri="{909E8E84-426E-40DD-AFC4-6F175D3DCCD1}">
-              <a14:hiddenFill xmlns:a14="http://schemas.microsoft.com/office/drawing/2010/main" xmlns="">
+              <a14:hiddenFill xmlns="" xmlns:a14="http://schemas.microsoft.com/office/drawing/2010/main">
                 <a:solidFill>
                   <a:srgbClr val="FFFFFF"/>
                 </a:solidFill>
               </a14:hiddenFill>
             </a:ext>
             <a:ext uri="{91240B29-F687-4F45-9708-019B960494DF}">
-              <a14:hiddenLine xmlns:a14="http://schemas.microsoft.com/office/drawing/2010/main" xmlns="" w="9525">
+              <a14:hiddenLine xmlns="" xmlns:a14="http://schemas.microsoft.com/office/drawing/2010/main" w="9525">
                 <a:solidFill>
                   <a:srgbClr val="000000"/>
                 </a:solidFill>
@@ -2341,7 +2341,7 @@
     </p:spTree>
     <p:extLst>
       <p:ext uri="{BB962C8B-B14F-4D97-AF65-F5344CB8AC3E}">
-        <p14:creationId xmlns:p14="http://schemas.microsoft.com/office/powerpoint/2010/main" xmlns="" val="3404298785"/>
+        <p14:creationId xmlns="" xmlns:p14="http://schemas.microsoft.com/office/powerpoint/2010/main" val="3404298785"/>
       </p:ext>
     </p:extLst>
   </p:cSld>
@@ -2526,7 +2526,7 @@
           <a:blip r:embed="rId2">
             <a:extLst>
               <a:ext uri="{28A0092B-C50C-407E-A947-70E740481C1C}">
-                <a14:useLocalDpi xmlns:a14="http://schemas.microsoft.com/office/drawing/2010/main" xmlns="" val="0"/>
+                <a14:useLocalDpi xmlns="" xmlns:a14="http://schemas.microsoft.com/office/drawing/2010/main" val="0"/>
               </a:ext>
             </a:extLst>
           </a:blip>
@@ -2549,14 +2549,14 @@
           </a:ln>
           <a:extLst>
             <a:ext uri="{909E8E84-426E-40DD-AFC4-6F175D3DCCD1}">
-              <a14:hiddenFill xmlns:a14="http://schemas.microsoft.com/office/drawing/2010/main" xmlns="">
+              <a14:hiddenFill xmlns="" xmlns:a14="http://schemas.microsoft.com/office/drawing/2010/main">
                 <a:solidFill>
                   <a:srgbClr val="FFFFFF"/>
                 </a:solidFill>
               </a14:hiddenFill>
             </a:ext>
             <a:ext uri="{91240B29-F687-4F45-9708-019B960494DF}">
-              <a14:hiddenLine xmlns:a14="http://schemas.microsoft.com/office/drawing/2010/main" xmlns="" w="9525">
+              <a14:hiddenLine xmlns="" xmlns:a14="http://schemas.microsoft.com/office/drawing/2010/main" w="9525">
                 <a:solidFill>
                   <a:srgbClr val="000000"/>
                 </a:solidFill>
@@ -2784,7 +2784,7 @@
     </p:spTree>
     <p:extLst>
       <p:ext uri="{BB962C8B-B14F-4D97-AF65-F5344CB8AC3E}">
-        <p14:creationId xmlns:p14="http://schemas.microsoft.com/office/powerpoint/2010/main" xmlns="" val="3982439678"/>
+        <p14:creationId xmlns="" xmlns:p14="http://schemas.microsoft.com/office/powerpoint/2010/main" val="3982439678"/>
       </p:ext>
     </p:extLst>
   </p:cSld>
@@ -2893,7 +2893,7 @@
           <a:blip r:embed="rId2">
             <a:extLst>
               <a:ext uri="{28A0092B-C50C-407E-A947-70E740481C1C}">
-                <a14:useLocalDpi xmlns:a14="http://schemas.microsoft.com/office/drawing/2010/main" xmlns="" val="0"/>
+                <a14:useLocalDpi xmlns="" xmlns:a14="http://schemas.microsoft.com/office/drawing/2010/main" val="0"/>
               </a:ext>
             </a:extLst>
           </a:blip>
@@ -2916,14 +2916,14 @@
           </a:ln>
           <a:extLst>
             <a:ext uri="{909E8E84-426E-40DD-AFC4-6F175D3DCCD1}">
-              <a14:hiddenFill xmlns:a14="http://schemas.microsoft.com/office/drawing/2010/main" xmlns="">
+              <a14:hiddenFill xmlns="" xmlns:a14="http://schemas.microsoft.com/office/drawing/2010/main">
                 <a:solidFill>
                   <a:srgbClr val="FFFFFF"/>
                 </a:solidFill>
               </a14:hiddenFill>
             </a:ext>
             <a:ext uri="{91240B29-F687-4F45-9708-019B960494DF}">
-              <a14:hiddenLine xmlns:a14="http://schemas.microsoft.com/office/drawing/2010/main" xmlns="" w="9525">
+              <a14:hiddenLine xmlns="" xmlns:a14="http://schemas.microsoft.com/office/drawing/2010/main" w="9525">
                 <a:solidFill>
                   <a:srgbClr val="000000"/>
                 </a:solidFill>
@@ -3037,7 +3037,7 @@
     </p:spTree>
     <p:extLst>
       <p:ext uri="{BB962C8B-B14F-4D97-AF65-F5344CB8AC3E}">
-        <p14:creationId xmlns:p14="http://schemas.microsoft.com/office/powerpoint/2010/main" xmlns="" val="3524090375"/>
+        <p14:creationId xmlns="" xmlns:p14="http://schemas.microsoft.com/office/powerpoint/2010/main" val="3524090375"/>
       </p:ext>
     </p:extLst>
   </p:cSld>
@@ -3096,14 +3096,14 @@
           </a:ln>
           <a:extLst>
             <a:ext uri="{909E8E84-426E-40DD-AFC4-6F175D3DCCD1}">
-              <a14:hiddenFill xmlns:a14="http://schemas.microsoft.com/office/drawing/2010/main" xmlns="">
+              <a14:hiddenFill xmlns="" xmlns:a14="http://schemas.microsoft.com/office/drawing/2010/main">
                 <a:solidFill>
                   <a:srgbClr val="FFFFFF"/>
                 </a:solidFill>
               </a14:hiddenFill>
             </a:ext>
             <a:ext uri="{91240B29-F687-4F45-9708-019B960494DF}">
-              <a14:hiddenLine xmlns:a14="http://schemas.microsoft.com/office/drawing/2010/main" xmlns="" w="9525">
+              <a14:hiddenLine xmlns="" xmlns:a14="http://schemas.microsoft.com/office/drawing/2010/main" w="9525">
                 <a:solidFill>
                   <a:srgbClr val="000000"/>
                 </a:solidFill>
@@ -3154,14 +3154,14 @@
           </a:ln>
           <a:extLst>
             <a:ext uri="{909E8E84-426E-40DD-AFC4-6F175D3DCCD1}">
-              <a14:hiddenFill xmlns:a14="http://schemas.microsoft.com/office/drawing/2010/main" xmlns="">
+              <a14:hiddenFill xmlns="" xmlns:a14="http://schemas.microsoft.com/office/drawing/2010/main">
                 <a:solidFill>
                   <a:srgbClr val="FFFFFF"/>
                 </a:solidFill>
               </a14:hiddenFill>
             </a:ext>
             <a:ext uri="{91240B29-F687-4F45-9708-019B960494DF}">
-              <a14:hiddenLine xmlns:a14="http://schemas.microsoft.com/office/drawing/2010/main" xmlns="" w="9525">
+              <a14:hiddenLine xmlns="" xmlns:a14="http://schemas.microsoft.com/office/drawing/2010/main" w="9525">
                 <a:solidFill>
                   <a:srgbClr val="000000"/>
                 </a:solidFill>
@@ -3823,14 +3823,6 @@
               </a:rPr>
               <a:t>Projektstatus 02.11.2016</a:t>
             </a:r>
-            <a:r>
-              <a:rPr lang="de-DE" dirty="0" smtClean="0">
-                <a:solidFill>
-                  <a:srgbClr val="00B1AC"/>
-                </a:solidFill>
-              </a:rPr>
-              <a:t/>
-            </a:r>
             <a:br>
               <a:rPr lang="de-DE" dirty="0" smtClean="0">
                 <a:solidFill>
@@ -3910,7 +3902,6 @@
               <a:rPr lang="de-DE" sz="1400" dirty="0" smtClean="0"/>
               <a:t>Gruppe 4, PO 2013</a:t>
             </a:r>
-            <a:endParaRPr lang="de-DE" sz="1400" dirty="0" smtClean="0"/>
           </a:p>
         </p:txBody>
       </p:sp>
@@ -3965,7 +3956,7 @@
     </p:spTree>
     <p:extLst>
       <p:ext uri="{BB962C8B-B14F-4D97-AF65-F5344CB8AC3E}">
-        <p14:creationId xmlns:p14="http://schemas.microsoft.com/office/powerpoint/2010/main" xmlns="" val="3083275860"/>
+        <p14:creationId xmlns="" xmlns:p14="http://schemas.microsoft.com/office/powerpoint/2010/main" val="3083275860"/>
       </p:ext>
     </p:extLst>
   </p:cSld>
@@ -4023,10 +4014,6 @@
               <a:rPr lang="de-DE" altLang="de-DE" dirty="0" smtClean="0"/>
               <a:t>SWE Projekt WS16/17</a:t>
             </a:r>
-            <a:r>
-              <a:rPr lang="de-DE" altLang="de-DE" dirty="0" smtClean="0"/>
-              <a:t/>
-            </a:r>
             <a:br>
               <a:rPr lang="de-DE" altLang="de-DE" dirty="0" smtClean="0"/>
             </a:br>
@@ -4040,10 +4027,6 @@
             <a:r>
               <a:rPr lang="de-DE" altLang="de-DE" dirty="0" smtClean="0"/>
               <a:t>Gruppe 4, PO 2013</a:t>
-            </a:r>
-            <a:r>
-              <a:rPr lang="de-DE" altLang="de-DE" dirty="0" smtClean="0"/>
-              <a:t/>
             </a:r>
             <a:br>
               <a:rPr lang="de-DE" altLang="de-DE" dirty="0" smtClean="0"/>
@@ -4083,14 +4066,14 @@
           <a:noFill/>
           <a:extLst>
             <a:ext uri="{909E8E84-426E-40DD-AFC4-6F175D3DCCD1}">
-              <a14:hiddenFill xmlns:a14="http://schemas.microsoft.com/office/drawing/2010/main" xmlns="">
+              <a14:hiddenFill xmlns="" xmlns:a14="http://schemas.microsoft.com/office/drawing/2010/main">
                 <a:solidFill>
                   <a:srgbClr val="FFFFFF"/>
                 </a:solidFill>
               </a14:hiddenFill>
             </a:ext>
             <a:ext uri="{91240B29-F687-4F45-9708-019B960494DF}">
-              <a14:hiddenLine xmlns:a14="http://schemas.microsoft.com/office/drawing/2010/main" xmlns="" w="9525">
+              <a14:hiddenLine xmlns="" xmlns:a14="http://schemas.microsoft.com/office/drawing/2010/main" w="9525">
                 <a:solidFill>
                   <a:srgbClr val="000000"/>
                 </a:solidFill>
@@ -4320,7 +4303,7 @@
             </a:pPr>
             <a:r>
               <a:rPr lang="de-DE" altLang="de-DE" dirty="0" smtClean="0"/>
-              <a:t>Kundentermin 26.10.</a:t>
+              <a:t>Kundentermin</a:t>
             </a:r>
             <a:endParaRPr lang="de-DE" altLang="de-DE" dirty="0" smtClean="0"/>
           </a:p>
@@ -4339,7 +4322,6 @@
               <a:rPr lang="de-DE" altLang="de-DE" dirty="0" smtClean="0"/>
               <a:t>Lastenheft</a:t>
             </a:r>
-            <a:endParaRPr lang="de-DE" altLang="de-DE" dirty="0" smtClean="0"/>
           </a:p>
           <a:p>
             <a:pPr marL="342900" lvl="0" indent="-342900">
@@ -4401,11 +4383,6 @@
               </a:rPr>
               <a:t>Ziele für nächste Woche</a:t>
             </a:r>
-            <a:endParaRPr lang="de-DE" altLang="de-DE" dirty="0" smtClean="0">
-              <a:solidFill>
-                <a:prstClr val="black"/>
-              </a:solidFill>
-            </a:endParaRPr>
           </a:p>
           <a:p>
             <a:pPr marL="342900" lvl="0" indent="-342900">
@@ -4520,23 +4497,7 @@
                   <a:prstClr val="black"/>
                 </a:solidFill>
               </a:rPr>
-              <a:t>Kundentermin am </a:t>
-            </a:r>
-            <a:r>
-              <a:rPr lang="de-DE" altLang="de-DE" dirty="0" smtClean="0">
-                <a:solidFill>
-                  <a:prstClr val="black"/>
-                </a:solidFill>
-              </a:rPr>
-              <a:t>26.10.2016	(1/2)</a:t>
-            </a:r>
-            <a:r>
-              <a:rPr lang="de-DE" altLang="de-DE" dirty="0" smtClean="0">
-                <a:solidFill>
-                  <a:prstClr val="black"/>
-                </a:solidFill>
-              </a:rPr>
-              <a:t/>
+              <a:t>Kundentermin am 26.10.2016	(1/2)</a:t>
             </a:r>
             <a:br>
               <a:rPr lang="de-DE" altLang="de-DE" dirty="0" smtClean="0">
@@ -4871,7 +4832,7 @@
     </p:spTree>
     <p:extLst>
       <p:ext uri="{BB962C8B-B14F-4D97-AF65-F5344CB8AC3E}">
-        <p14:creationId xmlns:p14="http://schemas.microsoft.com/office/powerpoint/2010/main" xmlns="" val="1764744486"/>
+        <p14:creationId xmlns="" xmlns:p14="http://schemas.microsoft.com/office/powerpoint/2010/main" val="1764744486"/>
       </p:ext>
     </p:extLst>
   </p:cSld>
@@ -4927,23 +4888,7 @@
                   <a:prstClr val="black"/>
                 </a:solidFill>
               </a:rPr>
-              <a:t>Kundentermin am </a:t>
-            </a:r>
-            <a:r>
-              <a:rPr lang="de-DE" altLang="de-DE" dirty="0" smtClean="0">
-                <a:solidFill>
-                  <a:prstClr val="black"/>
-                </a:solidFill>
-              </a:rPr>
-              <a:t>26.10.2016	(2/2)</a:t>
-            </a:r>
-            <a:r>
-              <a:rPr lang="de-DE" altLang="de-DE" dirty="0" smtClean="0">
-                <a:solidFill>
-                  <a:prstClr val="black"/>
-                </a:solidFill>
-              </a:rPr>
-              <a:t/>
+              <a:t>Kundentermin am 26.10.2016	(2/2)</a:t>
             </a:r>
             <a:br>
               <a:rPr lang="de-DE" altLang="de-DE" dirty="0" smtClean="0">
@@ -4992,23 +4937,7 @@
                   <a:prstClr val="black"/>
                 </a:solidFill>
               </a:rPr>
-              <a:t>Ampelsystem für </a:t>
-            </a:r>
-            <a:r>
-              <a:rPr lang="de-DE" altLang="de-DE" sz="2400" dirty="0" smtClean="0">
-                <a:solidFill>
-                  <a:prstClr val="black"/>
-                </a:solidFill>
-              </a:rPr>
-              <a:t>Füllstand </a:t>
-            </a:r>
-            <a:r>
-              <a:rPr lang="de-DE" altLang="de-DE" sz="2400" dirty="0" smtClean="0">
-                <a:solidFill>
-                  <a:prstClr val="black"/>
-                </a:solidFill>
-              </a:rPr>
-              <a:t>der Räume</a:t>
+              <a:t>Ampelsystem für Füllstand der Räume</a:t>
             </a:r>
           </a:p>
           <a:p>
@@ -5069,15 +4998,7 @@
                   <a:prstClr val="black"/>
                 </a:solidFill>
               </a:rPr>
-              <a:t> </a:t>
-            </a:r>
-            <a:r>
-              <a:rPr lang="de-DE" altLang="de-DE" sz="2400" dirty="0" smtClean="0">
-                <a:solidFill>
-                  <a:prstClr val="black"/>
-                </a:solidFill>
-              </a:rPr>
-              <a:t>ablehnen oder bestätigen ermöglichen</a:t>
+              <a:t> ablehnen oder bestätigen ermöglichen</a:t>
             </a:r>
           </a:p>
           <a:p>
@@ -5097,15 +5018,7 @@
                   <a:prstClr val="black"/>
                 </a:solidFill>
               </a:rPr>
-              <a:t>Administration über Seite ohne grafische </a:t>
-            </a:r>
-            <a:r>
-              <a:rPr lang="de-DE" altLang="de-DE" sz="2400" dirty="0" smtClean="0">
-                <a:solidFill>
-                  <a:prstClr val="black"/>
-                </a:solidFill>
-              </a:rPr>
-              <a:t>Anforderungen</a:t>
+              <a:t>Administration über Seite ohne grafische Anforderungen</a:t>
             </a:r>
           </a:p>
           <a:p>
@@ -5178,8 +5091,58 @@
                   <a:prstClr val="black"/>
                 </a:solidFill>
               </a:rPr>
-              <a:t>Nur Hochkant-Ansicht</a:t>
-            </a:r>
+              <a:t>Nur </a:t>
+            </a:r>
+            <a:r>
+              <a:rPr lang="de-DE" altLang="de-DE" sz="2400" dirty="0" smtClean="0">
+                <a:solidFill>
+                  <a:prstClr val="black"/>
+                </a:solidFill>
+              </a:rPr>
+              <a:t>Hochkant-Ansicht</a:t>
+            </a:r>
+          </a:p>
+          <a:p>
+            <a:pPr lvl="0">
+              <a:spcBef>
+                <a:spcPct val="0"/>
+              </a:spcBef>
+              <a:spcAft>
+                <a:spcPct val="0"/>
+              </a:spcAft>
+              <a:buFontTx/>
+              <a:buChar char="-"/>
+            </a:pPr>
+            <a:endParaRPr lang="de-DE" altLang="de-DE" sz="2400" dirty="0" smtClean="0">
+              <a:solidFill>
+                <a:prstClr val="black"/>
+              </a:solidFill>
+            </a:endParaRPr>
+          </a:p>
+          <a:p>
+            <a:pPr lvl="0">
+              <a:spcBef>
+                <a:spcPct val="0"/>
+              </a:spcBef>
+              <a:spcAft>
+                <a:spcPct val="0"/>
+              </a:spcAft>
+              <a:buFontTx/>
+              <a:buChar char="-"/>
+            </a:pPr>
+            <a:r>
+              <a:rPr lang="de-DE" altLang="de-DE" sz="2400" dirty="0" smtClean="0">
+                <a:solidFill>
+                  <a:prstClr val="black"/>
+                </a:solidFill>
+              </a:rPr>
+              <a:t>Nächster Kundentermin nächste Woche nach Einreichen einer ersten Version des Lastenheftes</a:t>
+            </a:r>
+            <a:endParaRPr lang="de-DE" altLang="de-DE" sz="2400" dirty="0" smtClean="0">
+              <a:solidFill>
+                <a:prstClr val="black"/>
+              </a:solidFill>
+            </a:endParaRPr>
           </a:p>
           <a:p>
             <a:pPr lvl="0">
@@ -5203,7 +5166,7 @@
     </p:spTree>
     <p:extLst>
       <p:ext uri="{BB962C8B-B14F-4D97-AF65-F5344CB8AC3E}">
-        <p14:creationId xmlns:p14="http://schemas.microsoft.com/office/powerpoint/2010/main" xmlns="" val="1764744486"/>
+        <p14:creationId xmlns="" xmlns:p14="http://schemas.microsoft.com/office/powerpoint/2010/main" val="1764744486"/>
       </p:ext>
     </p:extLst>
   </p:cSld>
@@ -5261,7 +5224,6 @@
               <a:rPr lang="de-DE" altLang="de-DE" dirty="0" smtClean="0"/>
               <a:t>Lastenheft</a:t>
             </a:r>
-            <a:endParaRPr lang="de-DE" altLang="de-DE" dirty="0" smtClean="0"/>
           </a:p>
         </p:txBody>
       </p:sp>
@@ -5287,14 +5249,14 @@
           </a:ln>
           <a:extLst>
             <a:ext uri="{909E8E84-426E-40DD-AFC4-6F175D3DCCD1}">
-              <a14:hiddenFill xmlns:a14="http://schemas.microsoft.com/office/drawing/2010/main" xmlns="">
+              <a14:hiddenFill xmlns="" xmlns:a14="http://schemas.microsoft.com/office/drawing/2010/main">
                 <a:solidFill>
                   <a:srgbClr val="FFFFFF"/>
                 </a:solidFill>
               </a14:hiddenFill>
             </a:ext>
             <a:ext uri="{91240B29-F687-4F45-9708-019B960494DF}">
-              <a14:hiddenLine xmlns:a14="http://schemas.microsoft.com/office/drawing/2010/main" xmlns="" w="9525">
+              <a14:hiddenLine xmlns="" xmlns:a14="http://schemas.microsoft.com/office/drawing/2010/main" w="9525">
                 <a:solidFill>
                   <a:srgbClr val="000000"/>
                 </a:solidFill>
@@ -5508,7 +5470,6 @@
               <a:rPr lang="de-DE" altLang="de-DE" dirty="0" smtClean="0"/>
               <a:t>Projektplan</a:t>
             </a:r>
-            <a:endParaRPr lang="de-DE" altLang="de-DE" dirty="0" smtClean="0"/>
           </a:p>
         </p:txBody>
       </p:sp>
@@ -5534,14 +5495,14 @@
           </a:ln>
           <a:extLst>
             <a:ext uri="{909E8E84-426E-40DD-AFC4-6F175D3DCCD1}">
-              <a14:hiddenFill xmlns:a14="http://schemas.microsoft.com/office/drawing/2010/main" xmlns="">
+              <a14:hiddenFill xmlns="" xmlns:a14="http://schemas.microsoft.com/office/drawing/2010/main">
                 <a:solidFill>
                   <a:srgbClr val="FFFFFF"/>
                 </a:solidFill>
               </a14:hiddenFill>
             </a:ext>
             <a:ext uri="{91240B29-F687-4F45-9708-019B960494DF}">
-              <a14:hiddenLine xmlns:a14="http://schemas.microsoft.com/office/drawing/2010/main" xmlns="" w="9525">
+              <a14:hiddenLine xmlns="" xmlns:a14="http://schemas.microsoft.com/office/drawing/2010/main" w="9525">
                 <a:solidFill>
                   <a:srgbClr val="000000"/>
                 </a:solidFill>
@@ -5796,7 +5757,6 @@
               <a:rPr lang="de-DE" altLang="de-DE" dirty="0" smtClean="0"/>
               <a:t>Zeiterfassung</a:t>
             </a:r>
-            <a:endParaRPr lang="de-DE" altLang="de-DE" dirty="0" smtClean="0"/>
           </a:p>
         </p:txBody>
       </p:sp>
@@ -5822,14 +5782,14 @@
           </a:ln>
           <a:extLst>
             <a:ext uri="{909E8E84-426E-40DD-AFC4-6F175D3DCCD1}">
-              <a14:hiddenFill xmlns:a14="http://schemas.microsoft.com/office/drawing/2010/main" xmlns="">
+              <a14:hiddenFill xmlns="" xmlns:a14="http://schemas.microsoft.com/office/drawing/2010/main">
                 <a:solidFill>
                   <a:srgbClr val="FFFFFF"/>
                 </a:solidFill>
               </a14:hiddenFill>
             </a:ext>
             <a:ext uri="{91240B29-F687-4F45-9708-019B960494DF}">
-              <a14:hiddenLine xmlns:a14="http://schemas.microsoft.com/office/drawing/2010/main" xmlns="" w="9525">
+              <a14:hiddenLine xmlns="" xmlns:a14="http://schemas.microsoft.com/office/drawing/2010/main" w="9525">
                 <a:solidFill>
                   <a:srgbClr val="000000"/>
                 </a:solidFill>
@@ -6091,7 +6051,6 @@
               <a:rPr lang="de-DE" altLang="de-DE" dirty="0" smtClean="0"/>
               <a:t>Anforderungssammlung fertigstellen</a:t>
             </a:r>
-            <a:endParaRPr lang="de-DE" altLang="de-DE" dirty="0" smtClean="0"/>
           </a:p>
           <a:p>
             <a:pPr marL="0" indent="0">
@@ -6143,7 +6102,6 @@
               <a:rPr lang="de-DE" altLang="de-DE" dirty="0" smtClean="0"/>
               <a:t>Ziele für nächste Woche</a:t>
             </a:r>
-            <a:endParaRPr lang="de-DE" altLang="de-DE" dirty="0" smtClean="0"/>
           </a:p>
         </p:txBody>
       </p:sp>
@@ -6210,7 +6168,6 @@
               <a:rPr lang="de-DE" altLang="de-DE" dirty="0" smtClean="0"/>
               <a:t>Ampelstatus</a:t>
             </a:r>
-            <a:endParaRPr lang="de-DE" altLang="de-DE" dirty="0" smtClean="0"/>
           </a:p>
         </p:txBody>
       </p:sp>
@@ -6302,7 +6259,6 @@
               <a:rPr lang="de-DE" altLang="de-DE" dirty="0" smtClean="0"/>
               <a:t>Lastenheft könnte weiter sein</a:t>
             </a:r>
-            <a:endParaRPr lang="de-DE" altLang="de-DE" dirty="0" smtClean="0"/>
           </a:p>
         </p:txBody>
       </p:sp>

</xml_diff>

<commit_message>
Screenshot aktueller Projektplan in Präsi eingefügt
</commit_message>
<xml_diff>
--- a/Dokumente/Coaching/2016-11-02 Präsentation Projektmgmt.pptx
+++ b/Dokumente/Coaching/2016-11-02 Präsentation Projektmgmt.pptx
@@ -243,7 +243,7 @@
               <a:pPr>
                 <a:defRPr/>
               </a:pPr>
-              <a:t>01.11.2016</a:t>
+              <a:t>02.11.2016</a:t>
             </a:fld>
             <a:endParaRPr lang="de-DE"/>
           </a:p>
@@ -327,7 +327,7 @@
     </p:spTree>
     <p:extLst>
       <p:ext uri="{BB962C8B-B14F-4D97-AF65-F5344CB8AC3E}">
-        <p14:creationId xmlns="" xmlns:p14="http://schemas.microsoft.com/office/powerpoint/2010/main" val="2667667891"/>
+        <p14:creationId xmlns:p14="http://schemas.microsoft.com/office/powerpoint/2010/main" xmlns="" val="2667667891"/>
       </p:ext>
     </p:extLst>
   </p:cSld>
@@ -426,7 +426,7 @@
               <a:pPr>
                 <a:defRPr/>
               </a:pPr>
-              <a:t>01.11.2016</a:t>
+              <a:t>02.11.2016</a:t>
             </a:fld>
             <a:endParaRPr lang="de-DE"/>
           </a:p>
@@ -605,7 +605,7 @@
     </p:spTree>
     <p:extLst>
       <p:ext uri="{BB962C8B-B14F-4D97-AF65-F5344CB8AC3E}">
-        <p14:creationId xmlns="" xmlns:p14="http://schemas.microsoft.com/office/powerpoint/2010/main" val="2795533648"/>
+        <p14:creationId xmlns:p14="http://schemas.microsoft.com/office/powerpoint/2010/main" xmlns="" val="2795533648"/>
       </p:ext>
     </p:extLst>
   </p:cSld>
@@ -778,7 +778,7 @@
           </a:ln>
           <a:extLst>
             <a:ext uri="{909E8E84-426E-40DD-AFC4-6F175D3DCCD1}">
-              <a14:hiddenFill xmlns="" xmlns:a14="http://schemas.microsoft.com/office/drawing/2010/main">
+              <a14:hiddenFill xmlns:a14="http://schemas.microsoft.com/office/drawing/2010/main" xmlns="">
                 <a:solidFill>
                   <a:srgbClr val="FFFFFF"/>
                 </a:solidFill>
@@ -801,14 +801,14 @@
           <a:noFill/>
           <a:extLst>
             <a:ext uri="{909E8E84-426E-40DD-AFC4-6F175D3DCCD1}">
-              <a14:hiddenFill xmlns="" xmlns:a14="http://schemas.microsoft.com/office/drawing/2010/main">
+              <a14:hiddenFill xmlns:a14="http://schemas.microsoft.com/office/drawing/2010/main" xmlns="">
                 <a:solidFill>
                   <a:srgbClr val="FFFFFF"/>
                 </a:solidFill>
               </a14:hiddenFill>
             </a:ext>
             <a:ext uri="{91240B29-F687-4F45-9708-019B960494DF}">
-              <a14:hiddenLine xmlns="" xmlns:a14="http://schemas.microsoft.com/office/drawing/2010/main" w="9525">
+              <a14:hiddenLine xmlns:a14="http://schemas.microsoft.com/office/drawing/2010/main" xmlns="" w="9525">
                 <a:solidFill>
                   <a:srgbClr val="000000"/>
                 </a:solidFill>
@@ -845,14 +845,14 @@
           <a:noFill/>
           <a:extLst>
             <a:ext uri="{909E8E84-426E-40DD-AFC4-6F175D3DCCD1}">
-              <a14:hiddenFill xmlns="" xmlns:a14="http://schemas.microsoft.com/office/drawing/2010/main">
+              <a14:hiddenFill xmlns:a14="http://schemas.microsoft.com/office/drawing/2010/main" xmlns="">
                 <a:solidFill>
                   <a:srgbClr val="FFFFFF"/>
                 </a:solidFill>
               </a14:hiddenFill>
             </a:ext>
             <a:ext uri="{91240B29-F687-4F45-9708-019B960494DF}">
-              <a14:hiddenLine xmlns="" xmlns:a14="http://schemas.microsoft.com/office/drawing/2010/main" w="9525">
+              <a14:hiddenLine xmlns:a14="http://schemas.microsoft.com/office/drawing/2010/main" xmlns="" w="9525">
                 <a:solidFill>
                   <a:srgbClr val="000000"/>
                 </a:solidFill>
@@ -1029,7 +1029,7 @@
           </a:ln>
           <a:extLst>
             <a:ext uri="{909E8E84-426E-40DD-AFC4-6F175D3DCCD1}">
-              <a14:hiddenFill xmlns="" xmlns:a14="http://schemas.microsoft.com/office/drawing/2010/main">
+              <a14:hiddenFill xmlns:a14="http://schemas.microsoft.com/office/drawing/2010/main" xmlns="">
                 <a:solidFill>
                   <a:srgbClr val="FFFFFF"/>
                 </a:solidFill>
@@ -1052,14 +1052,14 @@
           <a:noFill/>
           <a:extLst>
             <a:ext uri="{909E8E84-426E-40DD-AFC4-6F175D3DCCD1}">
-              <a14:hiddenFill xmlns="" xmlns:a14="http://schemas.microsoft.com/office/drawing/2010/main">
+              <a14:hiddenFill xmlns:a14="http://schemas.microsoft.com/office/drawing/2010/main" xmlns="">
                 <a:solidFill>
                   <a:srgbClr val="FFFFFF"/>
                 </a:solidFill>
               </a14:hiddenFill>
             </a:ext>
             <a:ext uri="{91240B29-F687-4F45-9708-019B960494DF}">
-              <a14:hiddenLine xmlns="" xmlns:a14="http://schemas.microsoft.com/office/drawing/2010/main" w="9525">
+              <a14:hiddenLine xmlns:a14="http://schemas.microsoft.com/office/drawing/2010/main" xmlns="" w="9525">
                 <a:solidFill>
                   <a:srgbClr val="000000"/>
                 </a:solidFill>
@@ -1096,14 +1096,14 @@
           <a:noFill/>
           <a:extLst>
             <a:ext uri="{909E8E84-426E-40DD-AFC4-6F175D3DCCD1}">
-              <a14:hiddenFill xmlns="" xmlns:a14="http://schemas.microsoft.com/office/drawing/2010/main">
+              <a14:hiddenFill xmlns:a14="http://schemas.microsoft.com/office/drawing/2010/main" xmlns="">
                 <a:solidFill>
                   <a:srgbClr val="FFFFFF"/>
                 </a:solidFill>
               </a14:hiddenFill>
             </a:ext>
             <a:ext uri="{91240B29-F687-4F45-9708-019B960494DF}">
-              <a14:hiddenLine xmlns="" xmlns:a14="http://schemas.microsoft.com/office/drawing/2010/main" w="9525">
+              <a14:hiddenLine xmlns:a14="http://schemas.microsoft.com/office/drawing/2010/main" xmlns="" w="9525">
                 <a:solidFill>
                   <a:srgbClr val="000000"/>
                 </a:solidFill>
@@ -1336,7 +1336,7 @@
           <a:blip r:embed="rId2">
             <a:extLst>
               <a:ext uri="{28A0092B-C50C-407E-A947-70E740481C1C}">
-                <a14:useLocalDpi xmlns="" xmlns:a14="http://schemas.microsoft.com/office/drawing/2010/main" val="0"/>
+                <a14:useLocalDpi xmlns:a14="http://schemas.microsoft.com/office/drawing/2010/main" xmlns="" val="0"/>
               </a:ext>
             </a:extLst>
           </a:blip>
@@ -1359,14 +1359,14 @@
           </a:ln>
           <a:extLst>
             <a:ext uri="{909E8E84-426E-40DD-AFC4-6F175D3DCCD1}">
-              <a14:hiddenFill xmlns="" xmlns:a14="http://schemas.microsoft.com/office/drawing/2010/main">
+              <a14:hiddenFill xmlns:a14="http://schemas.microsoft.com/office/drawing/2010/main" xmlns="">
                 <a:solidFill>
                   <a:srgbClr val="FFFFFF"/>
                 </a:solidFill>
               </a14:hiddenFill>
             </a:ext>
             <a:ext uri="{91240B29-F687-4F45-9708-019B960494DF}">
-              <a14:hiddenLine xmlns="" xmlns:a14="http://schemas.microsoft.com/office/drawing/2010/main" w="9525">
+              <a14:hiddenLine xmlns:a14="http://schemas.microsoft.com/office/drawing/2010/main" xmlns="" w="9525">
                 <a:solidFill>
                   <a:srgbClr val="000000"/>
                 </a:solidFill>
@@ -1598,7 +1598,7 @@
     </p:spTree>
     <p:extLst>
       <p:ext uri="{BB962C8B-B14F-4D97-AF65-F5344CB8AC3E}">
-        <p14:creationId xmlns="" xmlns:p14="http://schemas.microsoft.com/office/powerpoint/2010/main" val="161433667"/>
+        <p14:creationId xmlns:p14="http://schemas.microsoft.com/office/powerpoint/2010/main" xmlns="" val="161433667"/>
       </p:ext>
     </p:extLst>
   </p:cSld>
@@ -1745,7 +1745,7 @@
                 </a:tabLst>
                 <a:defRPr/>
               </a:pPr>
-              <a:t>1. November 2016</a:t>
+              <a:t>2. November 2016</a:t>
             </a:fld>
             <a:r>
               <a:rPr lang="de-DE" sz="800" dirty="0">
@@ -1783,7 +1783,7 @@
           <a:blip r:embed="rId2">
             <a:extLst>
               <a:ext uri="{28A0092B-C50C-407E-A947-70E740481C1C}">
-                <a14:useLocalDpi xmlns="" xmlns:a14="http://schemas.microsoft.com/office/drawing/2010/main" val="0"/>
+                <a14:useLocalDpi xmlns:a14="http://schemas.microsoft.com/office/drawing/2010/main" xmlns="" val="0"/>
               </a:ext>
             </a:extLst>
           </a:blip>
@@ -1806,14 +1806,14 @@
           </a:ln>
           <a:extLst>
             <a:ext uri="{909E8E84-426E-40DD-AFC4-6F175D3DCCD1}">
-              <a14:hiddenFill xmlns="" xmlns:a14="http://schemas.microsoft.com/office/drawing/2010/main">
+              <a14:hiddenFill xmlns:a14="http://schemas.microsoft.com/office/drawing/2010/main" xmlns="">
                 <a:solidFill>
                   <a:srgbClr val="FFFFFF"/>
                 </a:solidFill>
               </a14:hiddenFill>
             </a:ext>
             <a:ext uri="{91240B29-F687-4F45-9708-019B960494DF}">
-              <a14:hiddenLine xmlns="" xmlns:a14="http://schemas.microsoft.com/office/drawing/2010/main" w="9525">
+              <a14:hiddenLine xmlns:a14="http://schemas.microsoft.com/office/drawing/2010/main" xmlns="" w="9525">
                 <a:solidFill>
                   <a:srgbClr val="000000"/>
                 </a:solidFill>
@@ -1955,7 +1955,7 @@
     </p:spTree>
     <p:extLst>
       <p:ext uri="{BB962C8B-B14F-4D97-AF65-F5344CB8AC3E}">
-        <p14:creationId xmlns="" xmlns:p14="http://schemas.microsoft.com/office/powerpoint/2010/main" val="3865959554"/>
+        <p14:creationId xmlns:p14="http://schemas.microsoft.com/office/powerpoint/2010/main" xmlns="" val="3865959554"/>
       </p:ext>
     </p:extLst>
   </p:cSld>
@@ -2102,7 +2102,7 @@
                 </a:tabLst>
                 <a:defRPr/>
               </a:pPr>
-              <a:t>1. November 2016</a:t>
+              <a:t>2. November 2016</a:t>
             </a:fld>
             <a:r>
               <a:rPr lang="de-DE" sz="800" dirty="0">
@@ -2140,7 +2140,7 @@
           <a:blip r:embed="rId2">
             <a:extLst>
               <a:ext uri="{28A0092B-C50C-407E-A947-70E740481C1C}">
-                <a14:useLocalDpi xmlns="" xmlns:a14="http://schemas.microsoft.com/office/drawing/2010/main" val="0"/>
+                <a14:useLocalDpi xmlns:a14="http://schemas.microsoft.com/office/drawing/2010/main" xmlns="" val="0"/>
               </a:ext>
             </a:extLst>
           </a:blip>
@@ -2163,14 +2163,14 @@
           </a:ln>
           <a:extLst>
             <a:ext uri="{909E8E84-426E-40DD-AFC4-6F175D3DCCD1}">
-              <a14:hiddenFill xmlns="" xmlns:a14="http://schemas.microsoft.com/office/drawing/2010/main">
+              <a14:hiddenFill xmlns:a14="http://schemas.microsoft.com/office/drawing/2010/main" xmlns="">
                 <a:solidFill>
                   <a:srgbClr val="FFFFFF"/>
                 </a:solidFill>
               </a14:hiddenFill>
             </a:ext>
             <a:ext uri="{91240B29-F687-4F45-9708-019B960494DF}">
-              <a14:hiddenLine xmlns="" xmlns:a14="http://schemas.microsoft.com/office/drawing/2010/main" w="9525">
+              <a14:hiddenLine xmlns:a14="http://schemas.microsoft.com/office/drawing/2010/main" xmlns="" w="9525">
                 <a:solidFill>
                   <a:srgbClr val="000000"/>
                 </a:solidFill>
@@ -2341,7 +2341,7 @@
     </p:spTree>
     <p:extLst>
       <p:ext uri="{BB962C8B-B14F-4D97-AF65-F5344CB8AC3E}">
-        <p14:creationId xmlns="" xmlns:p14="http://schemas.microsoft.com/office/powerpoint/2010/main" val="3404298785"/>
+        <p14:creationId xmlns:p14="http://schemas.microsoft.com/office/powerpoint/2010/main" xmlns="" val="3404298785"/>
       </p:ext>
     </p:extLst>
   </p:cSld>
@@ -2488,7 +2488,7 @@
                 </a:tabLst>
                 <a:defRPr/>
               </a:pPr>
-              <a:t>1. November 2016</a:t>
+              <a:t>2. November 2016</a:t>
             </a:fld>
             <a:r>
               <a:rPr lang="de-DE" sz="800" dirty="0">
@@ -2526,7 +2526,7 @@
           <a:blip r:embed="rId2">
             <a:extLst>
               <a:ext uri="{28A0092B-C50C-407E-A947-70E740481C1C}">
-                <a14:useLocalDpi xmlns="" xmlns:a14="http://schemas.microsoft.com/office/drawing/2010/main" val="0"/>
+                <a14:useLocalDpi xmlns:a14="http://schemas.microsoft.com/office/drawing/2010/main" xmlns="" val="0"/>
               </a:ext>
             </a:extLst>
           </a:blip>
@@ -2549,14 +2549,14 @@
           </a:ln>
           <a:extLst>
             <a:ext uri="{909E8E84-426E-40DD-AFC4-6F175D3DCCD1}">
-              <a14:hiddenFill xmlns="" xmlns:a14="http://schemas.microsoft.com/office/drawing/2010/main">
+              <a14:hiddenFill xmlns:a14="http://schemas.microsoft.com/office/drawing/2010/main" xmlns="">
                 <a:solidFill>
                   <a:srgbClr val="FFFFFF"/>
                 </a:solidFill>
               </a14:hiddenFill>
             </a:ext>
             <a:ext uri="{91240B29-F687-4F45-9708-019B960494DF}">
-              <a14:hiddenLine xmlns="" xmlns:a14="http://schemas.microsoft.com/office/drawing/2010/main" w="9525">
+              <a14:hiddenLine xmlns:a14="http://schemas.microsoft.com/office/drawing/2010/main" xmlns="" w="9525">
                 <a:solidFill>
                   <a:srgbClr val="000000"/>
                 </a:solidFill>
@@ -2784,7 +2784,7 @@
     </p:spTree>
     <p:extLst>
       <p:ext uri="{BB962C8B-B14F-4D97-AF65-F5344CB8AC3E}">
-        <p14:creationId xmlns="" xmlns:p14="http://schemas.microsoft.com/office/powerpoint/2010/main" val="3982439678"/>
+        <p14:creationId xmlns:p14="http://schemas.microsoft.com/office/powerpoint/2010/main" xmlns="" val="3982439678"/>
       </p:ext>
     </p:extLst>
   </p:cSld>
@@ -2893,7 +2893,7 @@
           <a:blip r:embed="rId2">
             <a:extLst>
               <a:ext uri="{28A0092B-C50C-407E-A947-70E740481C1C}">
-                <a14:useLocalDpi xmlns="" xmlns:a14="http://schemas.microsoft.com/office/drawing/2010/main" val="0"/>
+                <a14:useLocalDpi xmlns:a14="http://schemas.microsoft.com/office/drawing/2010/main" xmlns="" val="0"/>
               </a:ext>
             </a:extLst>
           </a:blip>
@@ -2916,14 +2916,14 @@
           </a:ln>
           <a:extLst>
             <a:ext uri="{909E8E84-426E-40DD-AFC4-6F175D3DCCD1}">
-              <a14:hiddenFill xmlns="" xmlns:a14="http://schemas.microsoft.com/office/drawing/2010/main">
+              <a14:hiddenFill xmlns:a14="http://schemas.microsoft.com/office/drawing/2010/main" xmlns="">
                 <a:solidFill>
                   <a:srgbClr val="FFFFFF"/>
                 </a:solidFill>
               </a14:hiddenFill>
             </a:ext>
             <a:ext uri="{91240B29-F687-4F45-9708-019B960494DF}">
-              <a14:hiddenLine xmlns="" xmlns:a14="http://schemas.microsoft.com/office/drawing/2010/main" w="9525">
+              <a14:hiddenLine xmlns:a14="http://schemas.microsoft.com/office/drawing/2010/main" xmlns="" w="9525">
                 <a:solidFill>
                   <a:srgbClr val="000000"/>
                 </a:solidFill>
@@ -3037,7 +3037,7 @@
     </p:spTree>
     <p:extLst>
       <p:ext uri="{BB962C8B-B14F-4D97-AF65-F5344CB8AC3E}">
-        <p14:creationId xmlns="" xmlns:p14="http://schemas.microsoft.com/office/powerpoint/2010/main" val="3524090375"/>
+        <p14:creationId xmlns:p14="http://schemas.microsoft.com/office/powerpoint/2010/main" xmlns="" val="3524090375"/>
       </p:ext>
     </p:extLst>
   </p:cSld>
@@ -3096,14 +3096,14 @@
           </a:ln>
           <a:extLst>
             <a:ext uri="{909E8E84-426E-40DD-AFC4-6F175D3DCCD1}">
-              <a14:hiddenFill xmlns="" xmlns:a14="http://schemas.microsoft.com/office/drawing/2010/main">
+              <a14:hiddenFill xmlns:a14="http://schemas.microsoft.com/office/drawing/2010/main" xmlns="">
                 <a:solidFill>
                   <a:srgbClr val="FFFFFF"/>
                 </a:solidFill>
               </a14:hiddenFill>
             </a:ext>
             <a:ext uri="{91240B29-F687-4F45-9708-019B960494DF}">
-              <a14:hiddenLine xmlns="" xmlns:a14="http://schemas.microsoft.com/office/drawing/2010/main" w="9525">
+              <a14:hiddenLine xmlns:a14="http://schemas.microsoft.com/office/drawing/2010/main" xmlns="" w="9525">
                 <a:solidFill>
                   <a:srgbClr val="000000"/>
                 </a:solidFill>
@@ -3154,14 +3154,14 @@
           </a:ln>
           <a:extLst>
             <a:ext uri="{909E8E84-426E-40DD-AFC4-6F175D3DCCD1}">
-              <a14:hiddenFill xmlns="" xmlns:a14="http://schemas.microsoft.com/office/drawing/2010/main">
+              <a14:hiddenFill xmlns:a14="http://schemas.microsoft.com/office/drawing/2010/main" xmlns="">
                 <a:solidFill>
                   <a:srgbClr val="FFFFFF"/>
                 </a:solidFill>
               </a14:hiddenFill>
             </a:ext>
             <a:ext uri="{91240B29-F687-4F45-9708-019B960494DF}">
-              <a14:hiddenLine xmlns="" xmlns:a14="http://schemas.microsoft.com/office/drawing/2010/main" w="9525">
+              <a14:hiddenLine xmlns:a14="http://schemas.microsoft.com/office/drawing/2010/main" xmlns="" w="9525">
                 <a:solidFill>
                   <a:srgbClr val="000000"/>
                 </a:solidFill>
@@ -3262,7 +3262,7 @@
               <a:pPr>
                 <a:defRPr/>
               </a:pPr>
-              <a:t>1. November 2016</a:t>
+              <a:t>2. November 2016</a:t>
             </a:fld>
             <a:endParaRPr lang="de-DE" dirty="0"/>
           </a:p>
@@ -3956,7 +3956,7 @@
     </p:spTree>
     <p:extLst>
       <p:ext uri="{BB962C8B-B14F-4D97-AF65-F5344CB8AC3E}">
-        <p14:creationId xmlns="" xmlns:p14="http://schemas.microsoft.com/office/powerpoint/2010/main" val="3083275860"/>
+        <p14:creationId xmlns:p14="http://schemas.microsoft.com/office/powerpoint/2010/main" xmlns="" val="3083275860"/>
       </p:ext>
     </p:extLst>
   </p:cSld>
@@ -4066,14 +4066,14 @@
           <a:noFill/>
           <a:extLst>
             <a:ext uri="{909E8E84-426E-40DD-AFC4-6F175D3DCCD1}">
-              <a14:hiddenFill xmlns="" xmlns:a14="http://schemas.microsoft.com/office/drawing/2010/main">
+              <a14:hiddenFill xmlns:a14="http://schemas.microsoft.com/office/drawing/2010/main" xmlns="">
                 <a:solidFill>
                   <a:srgbClr val="FFFFFF"/>
                 </a:solidFill>
               </a14:hiddenFill>
             </a:ext>
             <a:ext uri="{91240B29-F687-4F45-9708-019B960494DF}">
-              <a14:hiddenLine xmlns="" xmlns:a14="http://schemas.microsoft.com/office/drawing/2010/main" w="9525">
+              <a14:hiddenLine xmlns:a14="http://schemas.microsoft.com/office/drawing/2010/main" xmlns="" w="9525">
                 <a:solidFill>
                   <a:srgbClr val="000000"/>
                 </a:solidFill>
@@ -4305,7 +4305,6 @@
               <a:rPr lang="de-DE" altLang="de-DE" dirty="0" smtClean="0"/>
               <a:t>Kundentermin</a:t>
             </a:r>
-            <a:endParaRPr lang="de-DE" altLang="de-DE" dirty="0" smtClean="0"/>
           </a:p>
           <a:p>
             <a:pPr marL="342900" indent="-342900">
@@ -4832,7 +4831,7 @@
     </p:spTree>
     <p:extLst>
       <p:ext uri="{BB962C8B-B14F-4D97-AF65-F5344CB8AC3E}">
-        <p14:creationId xmlns="" xmlns:p14="http://schemas.microsoft.com/office/powerpoint/2010/main" val="1764744486"/>
+        <p14:creationId xmlns:p14="http://schemas.microsoft.com/office/powerpoint/2010/main" xmlns="" val="1764744486"/>
       </p:ext>
     </p:extLst>
   </p:cSld>
@@ -5091,15 +5090,7 @@
                   <a:prstClr val="black"/>
                 </a:solidFill>
               </a:rPr>
-              <a:t>Nur </a:t>
-            </a:r>
-            <a:r>
-              <a:rPr lang="de-DE" altLang="de-DE" sz="2400" dirty="0" smtClean="0">
-                <a:solidFill>
-                  <a:prstClr val="black"/>
-                </a:solidFill>
-              </a:rPr>
-              <a:t>Hochkant-Ansicht</a:t>
+              <a:t>Nur Hochkant-Ansicht</a:t>
             </a:r>
           </a:p>
           <a:p>
@@ -5138,11 +5129,6 @@
               </a:rPr>
               <a:t>Nächster Kundentermin nächste Woche nach Einreichen einer ersten Version des Lastenheftes</a:t>
             </a:r>
-            <a:endParaRPr lang="de-DE" altLang="de-DE" sz="2400" dirty="0" smtClean="0">
-              <a:solidFill>
-                <a:prstClr val="black"/>
-              </a:solidFill>
-            </a:endParaRPr>
           </a:p>
           <a:p>
             <a:pPr lvl="0">
@@ -5166,7 +5152,7 @@
     </p:spTree>
     <p:extLst>
       <p:ext uri="{BB962C8B-B14F-4D97-AF65-F5344CB8AC3E}">
-        <p14:creationId xmlns="" xmlns:p14="http://schemas.microsoft.com/office/powerpoint/2010/main" val="1764744486"/>
+        <p14:creationId xmlns:p14="http://schemas.microsoft.com/office/powerpoint/2010/main" xmlns="" val="1764744486"/>
       </p:ext>
     </p:extLst>
   </p:cSld>
@@ -5249,14 +5235,14 @@
           </a:ln>
           <a:extLst>
             <a:ext uri="{909E8E84-426E-40DD-AFC4-6F175D3DCCD1}">
-              <a14:hiddenFill xmlns="" xmlns:a14="http://schemas.microsoft.com/office/drawing/2010/main">
+              <a14:hiddenFill xmlns:a14="http://schemas.microsoft.com/office/drawing/2010/main" xmlns="">
                 <a:solidFill>
                   <a:srgbClr val="FFFFFF"/>
                 </a:solidFill>
               </a14:hiddenFill>
             </a:ext>
             <a:ext uri="{91240B29-F687-4F45-9708-019B960494DF}">
-              <a14:hiddenLine xmlns="" xmlns:a14="http://schemas.microsoft.com/office/drawing/2010/main" w="9525">
+              <a14:hiddenLine xmlns:a14="http://schemas.microsoft.com/office/drawing/2010/main" xmlns="" w="9525">
                 <a:solidFill>
                   <a:srgbClr val="000000"/>
                 </a:solidFill>
@@ -5495,14 +5481,14 @@
           </a:ln>
           <a:extLst>
             <a:ext uri="{909E8E84-426E-40DD-AFC4-6F175D3DCCD1}">
-              <a14:hiddenFill xmlns="" xmlns:a14="http://schemas.microsoft.com/office/drawing/2010/main">
+              <a14:hiddenFill xmlns:a14="http://schemas.microsoft.com/office/drawing/2010/main" xmlns="">
                 <a:solidFill>
                   <a:srgbClr val="FFFFFF"/>
                 </a:solidFill>
               </a14:hiddenFill>
             </a:ext>
             <a:ext uri="{91240B29-F687-4F45-9708-019B960494DF}">
-              <a14:hiddenLine xmlns="" xmlns:a14="http://schemas.microsoft.com/office/drawing/2010/main" w="9525">
+              <a14:hiddenLine xmlns:a14="http://schemas.microsoft.com/office/drawing/2010/main" xmlns="" w="9525">
                 <a:solidFill>
                   <a:srgbClr val="000000"/>
                 </a:solidFill>
@@ -5591,7 +5577,15 @@
                   <a:prstClr val="black"/>
                 </a:solidFill>
               </a:rPr>
-              <a:t>Projektplan aktualisiert</a:t>
+              <a:t>Projektplan </a:t>
+            </a:r>
+            <a:r>
+              <a:rPr lang="de-DE" altLang="de-DE" sz="2400" dirty="0" smtClean="0">
+                <a:solidFill>
+                  <a:prstClr val="black"/>
+                </a:solidFill>
+              </a:rPr>
+              <a:t>aktualisiert</a:t>
             </a:r>
           </a:p>
           <a:p>
@@ -5606,64 +5600,65 @@
               <a:buChar char="-"/>
             </a:pPr>
             <a:r>
-              <a:rPr lang="de-DE" altLang="de-DE" sz="2400" dirty="0" err="1" smtClean="0">
+              <a:rPr lang="de-DE" altLang="de-DE" sz="2400" dirty="0" smtClean="0">
                 <a:solidFill>
                   <a:prstClr val="black"/>
                 </a:solidFill>
               </a:rPr>
-              <a:t>Milestones</a:t>
-            </a:r>
-            <a:r>
-              <a:rPr lang="de-DE" altLang="de-DE" sz="2400" dirty="0" smtClean="0">
-                <a:solidFill>
-                  <a:prstClr val="black"/>
-                </a:solidFill>
-              </a:rPr>
-              <a:t> eingefügt</a:t>
-            </a:r>
-          </a:p>
-          <a:p>
-            <a:pPr lvl="0">
-              <a:spcBef>
-                <a:spcPct val="0"/>
-              </a:spcBef>
-              <a:spcAft>
-                <a:spcPct val="0"/>
-              </a:spcAft>
-              <a:buFontTx/>
-              <a:buChar char="-"/>
-            </a:pPr>
-            <a:r>
-              <a:rPr lang="de-DE" altLang="de-DE" sz="2400" dirty="0" smtClean="0">
-                <a:solidFill>
-                  <a:prstClr val="black"/>
-                </a:solidFill>
-              </a:rPr>
-              <a:t>Verknüpfungen gesetzt</a:t>
-            </a:r>
-          </a:p>
-          <a:p>
-            <a:pPr lvl="0">
-              <a:spcBef>
-                <a:spcPct val="0"/>
-              </a:spcBef>
-              <a:spcAft>
-                <a:spcPct val="0"/>
-              </a:spcAft>
-              <a:buFontTx/>
-              <a:buChar char="-"/>
-            </a:pPr>
-            <a:endParaRPr lang="de-DE" altLang="de-DE" sz="2400" dirty="0">
+              <a:t>Zusammengesetzte Vorgänge eingefügt</a:t>
+            </a:r>
+            <a:endParaRPr lang="de-DE" altLang="de-DE" sz="2400" dirty="0" smtClean="0">
               <a:solidFill>
                 <a:prstClr val="black"/>
               </a:solidFill>
             </a:endParaRPr>
           </a:p>
+          <a:p>
+            <a:pPr lvl="0">
+              <a:spcBef>
+                <a:spcPct val="0"/>
+              </a:spcBef>
+              <a:spcAft>
+                <a:spcPct val="0"/>
+              </a:spcAft>
+              <a:buFontTx/>
+              <a:buChar char="-"/>
+            </a:pPr>
+            <a:r>
+              <a:rPr lang="de-DE" altLang="de-DE" sz="2400" dirty="0" err="1" smtClean="0">
+                <a:solidFill>
+                  <a:prstClr val="black"/>
+                </a:solidFill>
+              </a:rPr>
+              <a:t>Milestones</a:t>
+            </a:r>
+            <a:r>
+              <a:rPr lang="de-DE" altLang="de-DE" sz="2400" dirty="0" smtClean="0">
+                <a:solidFill>
+                  <a:prstClr val="black"/>
+                </a:solidFill>
+              </a:rPr>
+              <a:t> </a:t>
+            </a:r>
+            <a:r>
+              <a:rPr lang="de-DE" altLang="de-DE" sz="2400" dirty="0" smtClean="0">
+                <a:solidFill>
+                  <a:prstClr val="black"/>
+                </a:solidFill>
+              </a:rPr>
+              <a:t>eingefügt</a:t>
+            </a:r>
+            <a:endParaRPr lang="de-DE" altLang="de-DE" sz="2400" dirty="0" smtClean="0">
+              <a:solidFill>
+                <a:prstClr val="black"/>
+              </a:solidFill>
+            </a:endParaRPr>
+          </a:p>
         </p:txBody>
       </p:sp>
       <p:pic>
         <p:nvPicPr>
-          <p:cNvPr id="1027" name="Picture 3"/>
+          <p:cNvPr id="1026" name="Picture 2"/>
           <p:cNvPicPr>
             <a:picLocks noChangeAspect="1" noChangeArrowheads="1"/>
           </p:cNvPicPr>
@@ -5678,8 +5673,8 @@
         </p:blipFill>
         <p:spPr bwMode="auto">
           <a:xfrm>
-            <a:off x="142844" y="2928934"/>
-            <a:ext cx="8501122" cy="2786319"/>
+            <a:off x="285720" y="2643182"/>
+            <a:ext cx="8715404" cy="3494377"/>
           </a:xfrm>
           <a:prstGeom prst="rect">
             <a:avLst/>
@@ -5782,14 +5777,14 @@
           </a:ln>
           <a:extLst>
             <a:ext uri="{909E8E84-426E-40DD-AFC4-6F175D3DCCD1}">
-              <a14:hiddenFill xmlns="" xmlns:a14="http://schemas.microsoft.com/office/drawing/2010/main">
+              <a14:hiddenFill xmlns:a14="http://schemas.microsoft.com/office/drawing/2010/main" xmlns="">
                 <a:solidFill>
                   <a:srgbClr val="FFFFFF"/>
                 </a:solidFill>
               </a14:hiddenFill>
             </a:ext>
             <a:ext uri="{91240B29-F687-4F45-9708-019B960494DF}">
-              <a14:hiddenLine xmlns="" xmlns:a14="http://schemas.microsoft.com/office/drawing/2010/main" w="9525">
+              <a14:hiddenLine xmlns:a14="http://schemas.microsoft.com/office/drawing/2010/main" xmlns="" w="9525">
                 <a:solidFill>
                   <a:srgbClr val="000000"/>
                 </a:solidFill>

</xml_diff>